<commit_message>
Working on documenting serialization of ITypedElement
</commit_message>
<xml_diff>
--- a/fhirnetapi/images/elementmodel-isourcenode-example.pptx
+++ b/fhirnetapi/images/elementmodel-isourcenode-example.pptx
@@ -104,6 +104,11 @@
       </a:defRPr>
     </a:lvl9pPr>
   </p:defaultTextStyle>
+  <p:extLst>
+    <p:ext uri="{EFAFB233-063F-42B5-8137-9DF3F51BA10A}">
+      <p15:sldGuideLst xmlns:p15="http://schemas.microsoft.com/office/powerpoint/2012/main"/>
+    </p:ext>
+  </p:extLst>
 </p:presentation>
 </file>
 
@@ -254,7 +259,7 @@
           <a:p>
             <a:fld id="{F07FA14C-9CBA-4FBB-A985-2F2792852DBE}" type="datetimeFigureOut">
               <a:rPr lang="en-US" smtClean="0"/>
-              <a:t>9/14/2018</a:t>
+              <a:t>9/19/2018</a:t>
             </a:fld>
             <a:endParaRPr lang="en-US"/>
           </a:p>
@@ -452,7 +457,7 @@
           <a:p>
             <a:fld id="{F07FA14C-9CBA-4FBB-A985-2F2792852DBE}" type="datetimeFigureOut">
               <a:rPr lang="en-US" smtClean="0"/>
-              <a:t>9/14/2018</a:t>
+              <a:t>9/19/2018</a:t>
             </a:fld>
             <a:endParaRPr lang="en-US"/>
           </a:p>
@@ -660,7 +665,7 @@
           <a:p>
             <a:fld id="{F07FA14C-9CBA-4FBB-A985-2F2792852DBE}" type="datetimeFigureOut">
               <a:rPr lang="en-US" smtClean="0"/>
-              <a:t>9/14/2018</a:t>
+              <a:t>9/19/2018</a:t>
             </a:fld>
             <a:endParaRPr lang="en-US"/>
           </a:p>
@@ -858,7 +863,7 @@
           <a:p>
             <a:fld id="{F07FA14C-9CBA-4FBB-A985-2F2792852DBE}" type="datetimeFigureOut">
               <a:rPr lang="en-US" smtClean="0"/>
-              <a:t>9/14/2018</a:t>
+              <a:t>9/19/2018</a:t>
             </a:fld>
             <a:endParaRPr lang="en-US"/>
           </a:p>
@@ -1133,7 +1138,7 @@
           <a:p>
             <a:fld id="{F07FA14C-9CBA-4FBB-A985-2F2792852DBE}" type="datetimeFigureOut">
               <a:rPr lang="en-US" smtClean="0"/>
-              <a:t>9/14/2018</a:t>
+              <a:t>9/19/2018</a:t>
             </a:fld>
             <a:endParaRPr lang="en-US"/>
           </a:p>
@@ -1398,7 +1403,7 @@
           <a:p>
             <a:fld id="{F07FA14C-9CBA-4FBB-A985-2F2792852DBE}" type="datetimeFigureOut">
               <a:rPr lang="en-US" smtClean="0"/>
-              <a:t>9/14/2018</a:t>
+              <a:t>9/19/2018</a:t>
             </a:fld>
             <a:endParaRPr lang="en-US"/>
           </a:p>
@@ -1810,7 +1815,7 @@
           <a:p>
             <a:fld id="{F07FA14C-9CBA-4FBB-A985-2F2792852DBE}" type="datetimeFigureOut">
               <a:rPr lang="en-US" smtClean="0"/>
-              <a:t>9/14/2018</a:t>
+              <a:t>9/19/2018</a:t>
             </a:fld>
             <a:endParaRPr lang="en-US"/>
           </a:p>
@@ -1951,7 +1956,7 @@
           <a:p>
             <a:fld id="{F07FA14C-9CBA-4FBB-A985-2F2792852DBE}" type="datetimeFigureOut">
               <a:rPr lang="en-US" smtClean="0"/>
-              <a:t>9/14/2018</a:t>
+              <a:t>9/19/2018</a:t>
             </a:fld>
             <a:endParaRPr lang="en-US"/>
           </a:p>
@@ -2064,7 +2069,7 @@
           <a:p>
             <a:fld id="{F07FA14C-9CBA-4FBB-A985-2F2792852DBE}" type="datetimeFigureOut">
               <a:rPr lang="en-US" smtClean="0"/>
-              <a:t>9/14/2018</a:t>
+              <a:t>9/19/2018</a:t>
             </a:fld>
             <a:endParaRPr lang="en-US"/>
           </a:p>
@@ -2375,7 +2380,7 @@
           <a:p>
             <a:fld id="{F07FA14C-9CBA-4FBB-A985-2F2792852DBE}" type="datetimeFigureOut">
               <a:rPr lang="en-US" smtClean="0"/>
-              <a:t>9/14/2018</a:t>
+              <a:t>9/19/2018</a:t>
             </a:fld>
             <a:endParaRPr lang="en-US"/>
           </a:p>
@@ -2663,7 +2668,7 @@
           <a:p>
             <a:fld id="{F07FA14C-9CBA-4FBB-A985-2F2792852DBE}" type="datetimeFigureOut">
               <a:rPr lang="en-US" smtClean="0"/>
-              <a:t>9/14/2018</a:t>
+              <a:t>9/19/2018</a:t>
             </a:fld>
             <a:endParaRPr lang="en-US"/>
           </a:p>
@@ -2904,7 +2909,7 @@
           <a:p>
             <a:fld id="{F07FA14C-9CBA-4FBB-A985-2F2792852DBE}" type="datetimeFigureOut">
               <a:rPr lang="en-US" smtClean="0"/>
-              <a:t>9/14/2018</a:t>
+              <a:t>9/19/2018</a:t>
             </a:fld>
             <a:endParaRPr lang="en-US"/>
           </a:p>
@@ -3412,7 +3417,7 @@
         </p:nvSpPr>
         <p:spPr>
           <a:xfrm>
-            <a:off x="1585549" y="1753488"/>
+            <a:off x="3194539" y="1529671"/>
             <a:ext cx="2901461" cy="535419"/>
           </a:xfrm>
           <a:prstGeom prst="rect">
@@ -3503,7 +3508,7 @@
         </p:nvSpPr>
         <p:spPr>
           <a:xfrm>
-            <a:off x="1585548" y="2785239"/>
+            <a:off x="1403846" y="2513625"/>
             <a:ext cx="2901461" cy="643761"/>
           </a:xfrm>
           <a:prstGeom prst="rect">
@@ -3607,7 +3612,7 @@
         </p:nvSpPr>
         <p:spPr>
           <a:xfrm>
-            <a:off x="797171" y="4080544"/>
+            <a:off x="678481" y="4536507"/>
             <a:ext cx="2901461" cy="934003"/>
           </a:xfrm>
           <a:prstGeom prst="rect">
@@ -3726,7 +3731,7 @@
         </p:nvSpPr>
         <p:spPr>
           <a:xfrm>
-            <a:off x="3927229" y="4101061"/>
+            <a:off x="3749923" y="4540359"/>
             <a:ext cx="2901461" cy="913486"/>
           </a:xfrm>
           <a:prstGeom prst="rect">
@@ -3859,7 +3864,7 @@
         </p:nvSpPr>
         <p:spPr>
           <a:xfrm>
-            <a:off x="8282354" y="1720293"/>
+            <a:off x="8062546" y="1697735"/>
             <a:ext cx="2901461" cy="734710"/>
           </a:xfrm>
           <a:prstGeom prst="rect">
@@ -3964,7 +3969,7 @@
         </p:nvSpPr>
         <p:spPr>
           <a:xfrm>
-            <a:off x="8282353" y="2835506"/>
+            <a:off x="8062545" y="2793769"/>
             <a:ext cx="2901461" cy="1053177"/>
           </a:xfrm>
           <a:prstGeom prst="rect">
@@ -4069,97 +4074,6 @@
           </a:p>
         </p:txBody>
       </p:sp>
-      <p:sp>
-        <p:nvSpPr>
-          <p:cNvPr id="20" name="Rectangle 19">
-            <a:extLst>
-              <a:ext uri="{FF2B5EF4-FFF2-40B4-BE49-F238E27FC236}">
-                <a16:creationId xmlns:a16="http://schemas.microsoft.com/office/drawing/2014/main" id="{28485FED-811A-453B-AA71-58C45F0A8CB5}"/>
-              </a:ext>
-            </a:extLst>
-          </p:cNvPr>
-          <p:cNvSpPr/>
-          <p:nvPr/>
-        </p:nvSpPr>
-        <p:spPr>
-          <a:xfrm>
-            <a:off x="4868010" y="1753488"/>
-            <a:ext cx="2901461" cy="535419"/>
-          </a:xfrm>
-          <a:prstGeom prst="rect">
-            <a:avLst/>
-          </a:prstGeom>
-        </p:spPr>
-        <p:style>
-          <a:lnRef idx="2">
-            <a:schemeClr val="accent1"/>
-          </a:lnRef>
-          <a:fillRef idx="1">
-            <a:schemeClr val="lt1"/>
-          </a:fillRef>
-          <a:effectRef idx="0">
-            <a:schemeClr val="accent1"/>
-          </a:effectRef>
-          <a:fontRef idx="minor">
-            <a:schemeClr val="dk1"/>
-          </a:fontRef>
-        </p:style>
-        <p:txBody>
-          <a:bodyPr rtlCol="0" anchor="t"/>
-          <a:lstStyle/>
-          <a:p>
-            <a:r>
-              <a:rPr lang="en-US" sz="1400" b="1" dirty="0">
-                <a:cs typeface="Courier New" panose="02070309020205020404" pitchFamily="49" charset="0"/>
-              </a:rPr>
-              <a:t>Name:</a:t>
-            </a:r>
-            <a:r>
-              <a:rPr lang="en-US" sz="1400" b="1" dirty="0">
-                <a:latin typeface="Courier New" panose="02070309020205020404" pitchFamily="49" charset="0"/>
-                <a:cs typeface="Courier New" panose="02070309020205020404" pitchFamily="49" charset="0"/>
-              </a:rPr>
-              <a:t> ‘code’</a:t>
-            </a:r>
-          </a:p>
-          <a:p>
-            <a:r>
-              <a:rPr lang="en-US" sz="1400" dirty="0">
-                <a:cs typeface="Courier New" panose="02070309020205020404" pitchFamily="49" charset="0"/>
-              </a:rPr>
-              <a:t>Location:</a:t>
-            </a:r>
-            <a:r>
-              <a:rPr lang="en-US" sz="1400" dirty="0">
-                <a:latin typeface="Courier New" panose="02070309020205020404" pitchFamily="49" charset="0"/>
-                <a:cs typeface="Courier New" panose="02070309020205020404" pitchFamily="49" charset="0"/>
-              </a:rPr>
-              <a:t> </a:t>
-            </a:r>
-            <a:r>
-              <a:rPr lang="en-US" sz="1000" dirty="0">
-                <a:latin typeface="Courier New" panose="02070309020205020404" pitchFamily="49" charset="0"/>
-                <a:cs typeface="Courier New" panose="02070309020205020404" pitchFamily="49" charset="0"/>
-              </a:rPr>
-              <a:t>‘</a:t>
-            </a:r>
-            <a:r>
-              <a:rPr lang="en-US" sz="1000" dirty="0" err="1">
-                <a:latin typeface="Courier New" panose="02070309020205020404" pitchFamily="49" charset="0"/>
-                <a:cs typeface="Courier New" panose="02070309020205020404" pitchFamily="49" charset="0"/>
-              </a:rPr>
-              <a:t>Observation.code</a:t>
-            </a:r>
-            <a:r>
-              <a:rPr lang="en-US" sz="1000" dirty="0">
-                <a:latin typeface="Courier New" panose="02070309020205020404" pitchFamily="49" charset="0"/>
-                <a:cs typeface="Courier New" panose="02070309020205020404" pitchFamily="49" charset="0"/>
-              </a:rPr>
-              <a:t>[1]’</a:t>
-            </a:r>
-          </a:p>
-        </p:txBody>
-      </p:sp>
       <p:cxnSp>
         <p:nvCxnSpPr>
           <p:cNvPr id="22" name="Straight Arrow Connector 21">
@@ -4177,50 +4091,8 @@
         </p:nvCxnSpPr>
         <p:spPr>
           <a:xfrm flipH="1">
-            <a:off x="3036280" y="1192248"/>
-            <a:ext cx="3276600" cy="561240"/>
-          </a:xfrm>
-          <a:prstGeom prst="straightConnector1">
-            <a:avLst/>
-          </a:prstGeom>
-          <a:ln>
-            <a:tailEnd type="triangle"/>
-          </a:ln>
-        </p:spPr>
-        <p:style>
-          <a:lnRef idx="1">
-            <a:schemeClr val="accent1"/>
-          </a:lnRef>
-          <a:fillRef idx="0">
-            <a:schemeClr val="accent1"/>
-          </a:fillRef>
-          <a:effectRef idx="0">
-            <a:schemeClr val="accent1"/>
-          </a:effectRef>
-          <a:fontRef idx="minor">
-            <a:schemeClr val="tx1"/>
-          </a:fontRef>
-        </p:style>
-      </p:cxnSp>
-      <p:cxnSp>
-        <p:nvCxnSpPr>
-          <p:cNvPr id="24" name="Straight Arrow Connector 23">
-            <a:extLst>
-              <a:ext uri="{FF2B5EF4-FFF2-40B4-BE49-F238E27FC236}">
-                <a16:creationId xmlns:a16="http://schemas.microsoft.com/office/drawing/2014/main" id="{9CEF4A53-1AAD-421B-AD0A-281D50D0FDD1}"/>
-              </a:ext>
-            </a:extLst>
-          </p:cNvPr>
-          <p:cNvCxnSpPr>
-            <a:stCxn id="6" idx="2"/>
-            <a:endCxn id="20" idx="0"/>
-          </p:cNvCxnSpPr>
-          <p:nvPr/>
-        </p:nvCxnSpPr>
-        <p:spPr>
-          <a:xfrm>
-            <a:off x="6312880" y="1192248"/>
-            <a:ext cx="5861" cy="561240"/>
+            <a:off x="4645270" y="1192248"/>
+            <a:ext cx="1667610" cy="337423"/>
           </a:xfrm>
           <a:prstGeom prst="straightConnector1">
             <a:avLst/>
@@ -4262,7 +4134,7 @@
         <p:spPr>
           <a:xfrm>
             <a:off x="6312880" y="1192248"/>
-            <a:ext cx="3420205" cy="528045"/>
+            <a:ext cx="3200397" cy="505487"/>
           </a:xfrm>
           <a:prstGeom prst="straightConnector1">
             <a:avLst/>
@@ -4303,8 +4175,8 @@
         </p:nvCxnSpPr>
         <p:spPr>
           <a:xfrm flipH="1">
-            <a:off x="3036279" y="2288907"/>
-            <a:ext cx="1" cy="496332"/>
+            <a:off x="2854577" y="2065090"/>
+            <a:ext cx="1790693" cy="448535"/>
           </a:xfrm>
           <a:prstGeom prst="straightConnector1">
             <a:avLst/>
@@ -4345,8 +4217,8 @@
         </p:nvCxnSpPr>
         <p:spPr>
           <a:xfrm flipH="1">
-            <a:off x="2247902" y="3429000"/>
-            <a:ext cx="788377" cy="651544"/>
+            <a:off x="2129212" y="3157386"/>
+            <a:ext cx="725365" cy="1379121"/>
           </a:xfrm>
           <a:prstGeom prst="straightConnector1">
             <a:avLst/>
@@ -4387,8 +4259,8 @@
         </p:nvCxnSpPr>
         <p:spPr>
           <a:xfrm>
-            <a:off x="3036279" y="3429000"/>
-            <a:ext cx="2341681" cy="672061"/>
+            <a:off x="2854577" y="3157386"/>
+            <a:ext cx="2346077" cy="1382973"/>
           </a:xfrm>
           <a:prstGeom prst="straightConnector1">
             <a:avLst/>
@@ -4423,15 +4295,15 @@
           </p:cNvPr>
           <p:cNvCxnSpPr>
             <a:cxnSpLocks/>
-            <a:stCxn id="20" idx="2"/>
+            <a:stCxn id="21" idx="2"/>
             <a:endCxn id="36" idx="0"/>
           </p:cNvCxnSpPr>
           <p:nvPr/>
         </p:nvCxnSpPr>
         <p:spPr>
-          <a:xfrm>
-            <a:off x="6318741" y="2288907"/>
-            <a:ext cx="0" cy="463137"/>
+          <a:xfrm flipH="1">
+            <a:off x="6125309" y="3157386"/>
+            <a:ext cx="1" cy="276097"/>
           </a:xfrm>
           <a:prstGeom prst="straightConnector1">
             <a:avLst/>
@@ -4469,7 +4341,7 @@
         </p:nvSpPr>
         <p:spPr>
           <a:xfrm>
-            <a:off x="4868010" y="2752044"/>
+            <a:off x="4674578" y="3433483"/>
             <a:ext cx="2901461" cy="643761"/>
           </a:xfrm>
           <a:prstGeom prst="rect">
@@ -4525,8 +4397,155 @@
         </p:nvCxnSpPr>
         <p:spPr>
           <a:xfrm flipH="1">
-            <a:off x="9733084" y="2455003"/>
-            <a:ext cx="1" cy="380503"/>
+            <a:off x="9513276" y="2432445"/>
+            <a:ext cx="1" cy="361324"/>
+          </a:xfrm>
+          <a:prstGeom prst="straightConnector1">
+            <a:avLst/>
+          </a:prstGeom>
+          <a:ln>
+            <a:tailEnd type="triangle"/>
+          </a:ln>
+        </p:spPr>
+        <p:style>
+          <a:lnRef idx="1">
+            <a:schemeClr val="accent1"/>
+          </a:lnRef>
+          <a:fillRef idx="0">
+            <a:schemeClr val="accent1"/>
+          </a:fillRef>
+          <a:effectRef idx="0">
+            <a:schemeClr val="accent1"/>
+          </a:effectRef>
+          <a:fontRef idx="minor">
+            <a:schemeClr val="tx1"/>
+          </a:fontRef>
+        </p:style>
+      </p:cxnSp>
+      <p:sp>
+        <p:nvSpPr>
+          <p:cNvPr id="21" name="Rectangle 20">
+            <a:extLst>
+              <a:ext uri="{FF2B5EF4-FFF2-40B4-BE49-F238E27FC236}">
+                <a16:creationId xmlns:a16="http://schemas.microsoft.com/office/drawing/2014/main" id="{6BD3BEC6-1BDD-42CC-9B8A-B9F6EFC7BEE6}"/>
+              </a:ext>
+            </a:extLst>
+          </p:cNvPr>
+          <p:cNvSpPr/>
+          <p:nvPr/>
+        </p:nvSpPr>
+        <p:spPr>
+          <a:xfrm>
+            <a:off x="4674579" y="2513625"/>
+            <a:ext cx="2901461" cy="643761"/>
+          </a:xfrm>
+          <a:prstGeom prst="rect">
+            <a:avLst/>
+          </a:prstGeom>
+        </p:spPr>
+        <p:style>
+          <a:lnRef idx="2">
+            <a:schemeClr val="accent1"/>
+          </a:lnRef>
+          <a:fillRef idx="1">
+            <a:schemeClr val="lt1"/>
+          </a:fillRef>
+          <a:effectRef idx="0">
+            <a:schemeClr val="accent1"/>
+          </a:effectRef>
+          <a:fontRef idx="minor">
+            <a:schemeClr val="dk1"/>
+          </a:fontRef>
+        </p:style>
+        <p:txBody>
+          <a:bodyPr rtlCol="0" anchor="t"/>
+          <a:lstStyle/>
+          <a:p>
+            <a:r>
+              <a:rPr lang="en-US" sz="1400" b="1" dirty="0">
+                <a:cs typeface="Courier New" panose="02070309020205020404" pitchFamily="49" charset="0"/>
+              </a:rPr>
+              <a:t>Name:</a:t>
+            </a:r>
+            <a:r>
+              <a:rPr lang="en-US" sz="1400" b="1" dirty="0">
+                <a:latin typeface="Courier New" panose="02070309020205020404" pitchFamily="49" charset="0"/>
+                <a:cs typeface="Courier New" panose="02070309020205020404" pitchFamily="49" charset="0"/>
+              </a:rPr>
+              <a:t> ‘coding’</a:t>
+            </a:r>
+          </a:p>
+          <a:p>
+            <a:r>
+              <a:rPr lang="en-US" sz="1400" dirty="0">
+                <a:cs typeface="Courier New" panose="02070309020205020404" pitchFamily="49" charset="0"/>
+              </a:rPr>
+              <a:t>Location:</a:t>
+            </a:r>
+            <a:r>
+              <a:rPr lang="en-US" sz="1400" dirty="0">
+                <a:latin typeface="Courier New" panose="02070309020205020404" pitchFamily="49" charset="0"/>
+                <a:cs typeface="Courier New" panose="02070309020205020404" pitchFamily="49" charset="0"/>
+              </a:rPr>
+              <a:t> </a:t>
+            </a:r>
+            <a:r>
+              <a:rPr lang="en-US" sz="1000" dirty="0">
+                <a:latin typeface="Courier New" panose="02070309020205020404" pitchFamily="49" charset="0"/>
+                <a:cs typeface="Courier New" panose="02070309020205020404" pitchFamily="49" charset="0"/>
+              </a:rPr>
+              <a:t>‘</a:t>
+            </a:r>
+            <a:r>
+              <a:rPr lang="en-US" sz="1000" dirty="0" err="1">
+                <a:latin typeface="Courier New" panose="02070309020205020404" pitchFamily="49" charset="0"/>
+                <a:cs typeface="Courier New" panose="02070309020205020404" pitchFamily="49" charset="0"/>
+              </a:rPr>
+              <a:t>Observation.code</a:t>
+            </a:r>
+            <a:r>
+              <a:rPr lang="en-US" sz="1000" dirty="0">
+                <a:latin typeface="Courier New" panose="02070309020205020404" pitchFamily="49" charset="0"/>
+                <a:cs typeface="Courier New" panose="02070309020205020404" pitchFamily="49" charset="0"/>
+              </a:rPr>
+              <a:t>[0]</a:t>
+            </a:r>
+            <a:br>
+              <a:rPr lang="en-US" sz="1000" dirty="0">
+                <a:latin typeface="Courier New" panose="02070309020205020404" pitchFamily="49" charset="0"/>
+                <a:cs typeface="Courier New" panose="02070309020205020404" pitchFamily="49" charset="0"/>
+              </a:rPr>
+            </a:br>
+            <a:r>
+              <a:rPr lang="en-US" sz="1000" dirty="0">
+                <a:latin typeface="Courier New" panose="02070309020205020404" pitchFamily="49" charset="0"/>
+                <a:cs typeface="Courier New" panose="02070309020205020404" pitchFamily="49" charset="0"/>
+              </a:rPr>
+              <a:t>	.coding[1]’</a:t>
+            </a:r>
+          </a:p>
+        </p:txBody>
+      </p:sp>
+      <p:cxnSp>
+        <p:nvCxnSpPr>
+          <p:cNvPr id="23" name="Straight Arrow Connector 22">
+            <a:extLst>
+              <a:ext uri="{FF2B5EF4-FFF2-40B4-BE49-F238E27FC236}">
+                <a16:creationId xmlns:a16="http://schemas.microsoft.com/office/drawing/2014/main" id="{19BE6307-B481-4A77-B130-1E1644A95974}"/>
+              </a:ext>
+            </a:extLst>
+          </p:cNvPr>
+          <p:cNvCxnSpPr>
+            <a:cxnSpLocks/>
+            <a:stCxn id="10" idx="2"/>
+            <a:endCxn id="21" idx="0"/>
+          </p:cNvCxnSpPr>
+          <p:nvPr/>
+        </p:nvCxnSpPr>
+        <p:spPr>
+          <a:xfrm>
+            <a:off x="4645270" y="2065090"/>
+            <a:ext cx="1480040" cy="448535"/>
           </a:xfrm>
           <a:prstGeom prst="straightConnector1">
             <a:avLst/>

</xml_diff>